<commit_message>
Add command for k8s
</commit_message>
<xml_diff>
--- a/docs/2.K8s.pptx
+++ b/docs/2.K8s.pptx
@@ -1058,7 +1058,7 @@
           <a:p>
             <a:fld id="{F2A088DE-D0E2-4011-BFBF-CD00B36E6930}" type="datetimeFigureOut">
               <a:rPr lang="en-US" smtClean="0"/>
-              <a:t>3/27/2022</a:t>
+              <a:t>4/18/2022</a:t>
             </a:fld>
             <a:endParaRPr lang="en-US"/>
           </a:p>
@@ -1256,7 +1256,7 @@
           <a:p>
             <a:fld id="{F2A088DE-D0E2-4011-BFBF-CD00B36E6930}" type="datetimeFigureOut">
               <a:rPr lang="en-US" smtClean="0"/>
-              <a:t>3/27/2022</a:t>
+              <a:t>4/18/2022</a:t>
             </a:fld>
             <a:endParaRPr lang="en-US"/>
           </a:p>
@@ -1464,7 +1464,7 @@
           <a:p>
             <a:fld id="{F2A088DE-D0E2-4011-BFBF-CD00B36E6930}" type="datetimeFigureOut">
               <a:rPr lang="en-US" smtClean="0"/>
-              <a:t>3/27/2022</a:t>
+              <a:t>4/18/2022</a:t>
             </a:fld>
             <a:endParaRPr lang="en-US"/>
           </a:p>
@@ -1662,7 +1662,7 @@
           <a:p>
             <a:fld id="{F2A088DE-D0E2-4011-BFBF-CD00B36E6930}" type="datetimeFigureOut">
               <a:rPr lang="en-US" smtClean="0"/>
-              <a:t>3/27/2022</a:t>
+              <a:t>4/18/2022</a:t>
             </a:fld>
             <a:endParaRPr lang="en-US"/>
           </a:p>
@@ -1937,7 +1937,7 @@
           <a:p>
             <a:fld id="{F2A088DE-D0E2-4011-BFBF-CD00B36E6930}" type="datetimeFigureOut">
               <a:rPr lang="en-US" smtClean="0"/>
-              <a:t>3/27/2022</a:t>
+              <a:t>4/18/2022</a:t>
             </a:fld>
             <a:endParaRPr lang="en-US"/>
           </a:p>
@@ -2202,7 +2202,7 @@
           <a:p>
             <a:fld id="{F2A088DE-D0E2-4011-BFBF-CD00B36E6930}" type="datetimeFigureOut">
               <a:rPr lang="en-US" smtClean="0"/>
-              <a:t>3/27/2022</a:t>
+              <a:t>4/18/2022</a:t>
             </a:fld>
             <a:endParaRPr lang="en-US"/>
           </a:p>
@@ -2614,7 +2614,7 @@
           <a:p>
             <a:fld id="{F2A088DE-D0E2-4011-BFBF-CD00B36E6930}" type="datetimeFigureOut">
               <a:rPr lang="en-US" smtClean="0"/>
-              <a:t>3/27/2022</a:t>
+              <a:t>4/18/2022</a:t>
             </a:fld>
             <a:endParaRPr lang="en-US"/>
           </a:p>
@@ -2755,7 +2755,7 @@
           <a:p>
             <a:fld id="{F2A088DE-D0E2-4011-BFBF-CD00B36E6930}" type="datetimeFigureOut">
               <a:rPr lang="en-US" smtClean="0"/>
-              <a:t>3/27/2022</a:t>
+              <a:t>4/18/2022</a:t>
             </a:fld>
             <a:endParaRPr lang="en-US"/>
           </a:p>
@@ -2868,7 +2868,7 @@
           <a:p>
             <a:fld id="{F2A088DE-D0E2-4011-BFBF-CD00B36E6930}" type="datetimeFigureOut">
               <a:rPr lang="en-US" smtClean="0"/>
-              <a:t>3/27/2022</a:t>
+              <a:t>4/18/2022</a:t>
             </a:fld>
             <a:endParaRPr lang="en-US"/>
           </a:p>
@@ -3179,7 +3179,7 @@
           <a:p>
             <a:fld id="{F2A088DE-D0E2-4011-BFBF-CD00B36E6930}" type="datetimeFigureOut">
               <a:rPr lang="en-US" smtClean="0"/>
-              <a:t>3/27/2022</a:t>
+              <a:t>4/18/2022</a:t>
             </a:fld>
             <a:endParaRPr lang="en-US"/>
           </a:p>
@@ -3467,7 +3467,7 @@
           <a:p>
             <a:fld id="{F2A088DE-D0E2-4011-BFBF-CD00B36E6930}" type="datetimeFigureOut">
               <a:rPr lang="en-US" smtClean="0"/>
-              <a:t>3/27/2022</a:t>
+              <a:t>4/18/2022</a:t>
             </a:fld>
             <a:endParaRPr lang="en-US"/>
           </a:p>
@@ -3708,7 +3708,7 @@
           <a:p>
             <a:fld id="{F2A088DE-D0E2-4011-BFBF-CD00B36E6930}" type="datetimeFigureOut">
               <a:rPr lang="en-US" smtClean="0"/>
-              <a:t>3/27/2022</a:t>
+              <a:t>4/18/2022</a:t>
             </a:fld>
             <a:endParaRPr lang="en-US"/>
           </a:p>
@@ -7910,9 +7910,16 @@
             <p:ph idx="1"/>
           </p:nvPr>
         </p:nvSpPr>
-        <p:spPr/>
-        <p:txBody>
-          <a:bodyPr/>
+        <p:spPr>
+          <a:xfrm>
+            <a:off x="838200" y="1584356"/>
+            <a:ext cx="10515600" cy="4979405"/>
+          </a:xfrm>
+        </p:spPr>
+        <p:txBody>
+          <a:bodyPr>
+            <a:normAutofit/>
+          </a:bodyPr>
           <a:lstStyle/>
           <a:p>
             <a:r>
@@ -8006,6 +8013,76 @@
             <a:r>
               <a:rPr lang="en-US" dirty="0"/>
               <a:t> exec -it pod-name -- /bin/bash</a:t>
+            </a:r>
+          </a:p>
+          <a:p>
+            <a:pPr lvl="1"/>
+            <a:r>
+              <a:rPr lang="en-US" dirty="0" err="1"/>
+              <a:t>kubectl</a:t>
+            </a:r>
+            <a:r>
+              <a:rPr lang="en-US" dirty="0"/>
+              <a:t> -n </a:t>
+            </a:r>
+            <a:r>
+              <a:rPr lang="en-US" dirty="0" err="1"/>
+              <a:t>kube</a:t>
+            </a:r>
+            <a:r>
+              <a:rPr lang="en-US" dirty="0"/>
+              <a:t>-system port-forward --address 0.0.0.0 service/&lt;</a:t>
+            </a:r>
+            <a:r>
+              <a:rPr lang="en-US" dirty="0" err="1"/>
+              <a:t>servicename</a:t>
+            </a:r>
+            <a:r>
+              <a:rPr lang="en-US" dirty="0"/>
+              <a:t>&gt; &lt;</a:t>
+            </a:r>
+            <a:r>
+              <a:rPr lang="en-US" dirty="0" err="1"/>
+              <a:t>hostport</a:t>
+            </a:r>
+            <a:r>
+              <a:rPr lang="en-US" dirty="0"/>
+              <a:t>&gt;:&lt;</a:t>
+            </a:r>
+            <a:r>
+              <a:rPr lang="en-US" dirty="0" err="1"/>
+              <a:t>serviceport</a:t>
+            </a:r>
+            <a:r>
+              <a:rPr lang="en-US" dirty="0"/>
+              <a:t>&gt;  --namespace your-namespace</a:t>
+            </a:r>
+          </a:p>
+          <a:p>
+            <a:pPr lvl="2"/>
+            <a:r>
+              <a:rPr lang="en-US" dirty="0" err="1"/>
+              <a:t>kubectl</a:t>
+            </a:r>
+            <a:r>
+              <a:rPr lang="en-US" dirty="0"/>
+              <a:t> -n </a:t>
+            </a:r>
+            <a:r>
+              <a:rPr lang="en-US" dirty="0" err="1"/>
+              <a:t>kube</a:t>
+            </a:r>
+            <a:r>
+              <a:rPr lang="en-US" dirty="0"/>
+              <a:t>-system port-forward --address 0.0.0.0 service/</a:t>
+            </a:r>
+            <a:r>
+              <a:rPr lang="en-US" dirty="0" err="1"/>
+              <a:t>abcApp</a:t>
+            </a:r>
+            <a:r>
+              <a:rPr lang="en-US" dirty="0"/>
+              <a:t> 20000:80  --namespace apps</a:t>
             </a:r>
           </a:p>
         </p:txBody>

</xml_diff>